<commit_message>
Poprawki i trochę wnisków
</commit_message>
<xml_diff>
--- a/Lab5_dane/AP_L05_20190327_0800_G01.pptx
+++ b/Lab5_dane/AP_L05_20190327_0800_G01.pptx
@@ -7153,8 +7153,8 @@
           </a:p>
         </p:txBody>
       </p:sp>
-      <mc:AlternateContent xmlns:mc="http://schemas.openxmlformats.org/markup-compatibility/2006">
-        <mc:Choice xmlns:a14="http://schemas.microsoft.com/office/drawing/2010/main" Requires="a14">
+      <mc:AlternateContent xmlns:mc="http://schemas.openxmlformats.org/markup-compatibility/2006" xmlns:a14="http://schemas.microsoft.com/office/drawing/2010/main">
+        <mc:Choice Requires="a14">
           <p:sp>
             <p:nvSpPr>
               <p:cNvPr id="2" name="pole tekstowe 1">
@@ -7446,7 +7446,7 @@
             </p:txBody>
           </p:sp>
         </mc:Choice>
-        <mc:Fallback>
+        <mc:Fallback xmlns="">
           <p:sp>
             <p:nvSpPr>
               <p:cNvPr id="2" name="pole tekstowe 1">
@@ -7876,7 +7876,7 @@
         </p:nvSpPr>
         <p:spPr>
           <a:xfrm>
-            <a:off x="4643743" y="5223922"/>
+            <a:off x="4002731" y="4545894"/>
             <a:ext cx="1534243" cy="369332"/>
           </a:xfrm>
           <a:prstGeom prst="rect">
@@ -7913,7 +7913,7 @@
         </p:nvCxnSpPr>
         <p:spPr>
           <a:xfrm flipV="1">
-            <a:off x="7219649" y="4416662"/>
+            <a:off x="7257263" y="3626550"/>
             <a:ext cx="0" cy="688922"/>
           </a:xfrm>
           <a:prstGeom prst="straightConnector1">
@@ -7952,7 +7952,7 @@
         </p:nvSpPr>
         <p:spPr>
           <a:xfrm>
-            <a:off x="6596109" y="5255581"/>
+            <a:off x="6614850" y="4297994"/>
             <a:ext cx="1908699" cy="369332"/>
           </a:xfrm>
           <a:prstGeom prst="rect">
@@ -7988,9 +7988,9 @@
           <p:nvPr/>
         </p:nvCxnSpPr>
         <p:spPr>
-          <a:xfrm>
-            <a:off x="2122831" y="2175230"/>
-            <a:ext cx="785483" cy="1"/>
+          <a:xfrm flipV="1">
+            <a:off x="1913847" y="2305019"/>
+            <a:ext cx="2250" cy="285571"/>
           </a:xfrm>
           <a:prstGeom prst="straightConnector1">
             <a:avLst/>
@@ -8489,8 +8489,8 @@
         </p:blipFill>
         <p:spPr>
           <a:xfrm>
-            <a:off x="263574" y="1842568"/>
-            <a:ext cx="3627131" cy="3768288"/>
+            <a:off x="54745" y="786125"/>
+            <a:ext cx="2938509" cy="3768288"/>
           </a:xfrm>
           <a:prstGeom prst="rect">
             <a:avLst/>
@@ -8519,8 +8519,8 @@
         </p:blipFill>
         <p:spPr>
           <a:xfrm>
-            <a:off x="5472476" y="541631"/>
-            <a:ext cx="3368809" cy="3488109"/>
+            <a:off x="3048553" y="786125"/>
+            <a:ext cx="2819752" cy="3768288"/>
           </a:xfrm>
           <a:prstGeom prst="rect">
             <a:avLst/>
@@ -8549,8 +8549,8 @@
         </p:blipFill>
         <p:spPr>
           <a:xfrm>
-            <a:off x="4090297" y="2981011"/>
-            <a:ext cx="2819751" cy="2934259"/>
+            <a:off x="5978349" y="786127"/>
+            <a:ext cx="2819751" cy="3768287"/>
           </a:xfrm>
           <a:prstGeom prst="rect">
             <a:avLst/>
@@ -8897,7 +8897,7 @@
         <p:spPr>
           <a:xfrm>
             <a:off x="308344" y="1488558"/>
-            <a:ext cx="7868093" cy="1200329"/>
+            <a:ext cx="7868093" cy="2031325"/>
           </a:xfrm>
           <a:prstGeom prst="rect">
             <a:avLst/>
@@ -8926,13 +8926,8 @@
           <a:p>
             <a:r>
               <a:rPr lang="pl-PL" dirty="0"/>
-              <a:t>Dowiedzieliśmy się jak stworzyć elementy interfejsu użytkownika i połączyć je z </a:t>
-            </a:r>
-            <a:r>
-              <a:rPr lang="pl-PL"/>
-              <a:t>wprowadzanymi wartościami.</a:t>
-            </a:r>
-            <a:endParaRPr lang="pl-PL" dirty="0"/>
+              <a:t>Dowiedzieliśmy się jak stworzyć elementy interfejsu użytkownika i połączyć je z wprowadzanymi wartościami. Nauczyliśmy się w jaki sposób możemy symulować działanie elementów wykonawczych samochodu. Zdobyte informacje pozwalają nam na zasymulowanie we własnym zakresie takich elementów jak wskaźnik poziomu paliwa, licznik prędkości samochodu, wskaźnik temperatury itp.</a:t>
+            </a:r>
           </a:p>
         </p:txBody>
       </p:sp>

</xml_diff>

<commit_message>
Radar - kod + sprawko
</commit_message>
<xml_diff>
--- a/Lab5_dane/AP_L05_20190327_0800_G01.pptx
+++ b/Lab5_dane/AP_L05_20190327_0800_G01.pptx
@@ -7876,7 +7876,7 @@
         </p:nvSpPr>
         <p:spPr>
           <a:xfrm>
-            <a:off x="4002731" y="4545894"/>
+            <a:off x="4269820" y="4499724"/>
             <a:ext cx="1534243" cy="369332"/>
           </a:xfrm>
           <a:prstGeom prst="rect">
@@ -7913,7 +7913,7 @@
         </p:nvCxnSpPr>
         <p:spPr>
           <a:xfrm flipV="1">
-            <a:off x="7257263" y="3626550"/>
+            <a:off x="7210343" y="4297394"/>
             <a:ext cx="0" cy="688922"/>
           </a:xfrm>
           <a:prstGeom prst="straightConnector1">
@@ -7952,7 +7952,7 @@
         </p:nvSpPr>
         <p:spPr>
           <a:xfrm>
-            <a:off x="6614850" y="4297994"/>
+            <a:off x="6548749" y="5179126"/>
             <a:ext cx="1908699" cy="369332"/>
           </a:xfrm>
           <a:prstGeom prst="rect">
@@ -7969,82 +7969,6 @@
             <a:r>
               <a:rPr lang="pl-PL" dirty="0"/>
               <a:t>Kod węzła B</a:t>
-            </a:r>
-          </a:p>
-        </p:txBody>
-      </p:sp>
-      <p:cxnSp>
-        <p:nvCxnSpPr>
-          <p:cNvPr id="23" name="Łącznik prosty ze strzałką 22">
-            <a:extLst>
-              <a:ext uri="{FF2B5EF4-FFF2-40B4-BE49-F238E27FC236}">
-                <a16:creationId xmlns:a16="http://schemas.microsoft.com/office/drawing/2014/main" id="{866E724D-939D-4628-892D-E403DF6C45DC}"/>
-              </a:ext>
-            </a:extLst>
-          </p:cNvPr>
-          <p:cNvCxnSpPr>
-            <a:cxnSpLocks/>
-          </p:cNvCxnSpPr>
-          <p:nvPr/>
-        </p:nvCxnSpPr>
-        <p:spPr>
-          <a:xfrm flipV="1">
-            <a:off x="1913847" y="2305019"/>
-            <a:ext cx="2250" cy="285571"/>
-          </a:xfrm>
-          <a:prstGeom prst="straightConnector1">
-            <a:avLst/>
-          </a:prstGeom>
-          <a:ln>
-            <a:tailEnd type="triangle"/>
-          </a:ln>
-        </p:spPr>
-        <p:style>
-          <a:lnRef idx="2">
-            <a:schemeClr val="accent1"/>
-          </a:lnRef>
-          <a:fillRef idx="0">
-            <a:schemeClr val="accent1"/>
-          </a:fillRef>
-          <a:effectRef idx="1">
-            <a:schemeClr val="accent1"/>
-          </a:effectRef>
-          <a:fontRef idx="minor">
-            <a:schemeClr val="tx1"/>
-          </a:fontRef>
-        </p:style>
-      </p:cxnSp>
-      <p:sp>
-        <p:nvSpPr>
-          <p:cNvPr id="27" name="pole tekstowe 26">
-            <a:extLst>
-              <a:ext uri="{FF2B5EF4-FFF2-40B4-BE49-F238E27FC236}">
-                <a16:creationId xmlns:a16="http://schemas.microsoft.com/office/drawing/2014/main" id="{E6F2E9EB-031E-4BB4-8288-4931391ABD1A}"/>
-              </a:ext>
-            </a:extLst>
-          </p:cNvPr>
-          <p:cNvSpPr txBox="1"/>
-          <p:nvPr/>
-        </p:nvSpPr>
-        <p:spPr>
-          <a:xfrm>
-            <a:off x="1444047" y="2582710"/>
-            <a:ext cx="1398510" cy="369332"/>
-          </a:xfrm>
-          <a:prstGeom prst="rect">
-            <a:avLst/>
-          </a:prstGeom>
-          <a:noFill/>
-        </p:spPr>
-        <p:txBody>
-          <a:bodyPr wrap="square" rtlCol="0">
-            <a:spAutoFit/>
-          </a:bodyPr>
-          <a:lstStyle/>
-          <a:p>
-            <a:r>
-              <a:rPr lang="pl-PL" dirty="0"/>
-              <a:t>Schemat</a:t>
             </a:r>
           </a:p>
         </p:txBody>
@@ -8071,7 +7995,7 @@
         </p:blipFill>
         <p:spPr>
           <a:xfrm>
-            <a:off x="146082" y="3153854"/>
+            <a:off x="107756" y="3429000"/>
             <a:ext cx="3708219" cy="2880113"/>
           </a:xfrm>
           <a:prstGeom prst="rect">
@@ -8101,8 +8025,8 @@
         </p:blipFill>
         <p:spPr>
           <a:xfrm>
-            <a:off x="3905510" y="742838"/>
-            <a:ext cx="4892932" cy="2803176"/>
+            <a:off x="2961154" y="787837"/>
+            <a:ext cx="5984408" cy="3329195"/>
           </a:xfrm>
           <a:prstGeom prst="rect">
             <a:avLst/>
@@ -8130,14 +8054,49 @@
         </p:blipFill>
         <p:spPr>
           <a:xfrm>
-            <a:off x="381094" y="825058"/>
-            <a:ext cx="1807494" cy="1765532"/>
+            <a:off x="198438" y="691016"/>
+            <a:ext cx="2392362" cy="2336822"/>
           </a:xfrm>
           <a:prstGeom prst="rect">
             <a:avLst/>
           </a:prstGeom>
         </p:spPr>
       </p:pic>
+      <p:sp>
+        <p:nvSpPr>
+          <p:cNvPr id="27" name="pole tekstowe 26">
+            <a:extLst>
+              <a:ext uri="{FF2B5EF4-FFF2-40B4-BE49-F238E27FC236}">
+                <a16:creationId xmlns:a16="http://schemas.microsoft.com/office/drawing/2014/main" id="{E6F2E9EB-031E-4BB4-8288-4931391ABD1A}"/>
+              </a:ext>
+            </a:extLst>
+          </p:cNvPr>
+          <p:cNvSpPr txBox="1"/>
+          <p:nvPr/>
+        </p:nvSpPr>
+        <p:spPr>
+          <a:xfrm>
+            <a:off x="1302062" y="2339106"/>
+            <a:ext cx="1398510" cy="369332"/>
+          </a:xfrm>
+          <a:prstGeom prst="rect">
+            <a:avLst/>
+          </a:prstGeom>
+          <a:noFill/>
+        </p:spPr>
+        <p:txBody>
+          <a:bodyPr wrap="square" rtlCol="0">
+            <a:spAutoFit/>
+          </a:bodyPr>
+          <a:lstStyle/>
+          <a:p>
+            <a:r>
+              <a:rPr lang="pl-PL" dirty="0"/>
+              <a:t>Schemat</a:t>
+            </a:r>
+          </a:p>
+        </p:txBody>
+      </p:sp>
     </p:spTree>
   </p:cSld>
   <p:clrMapOvr>
@@ -8557,6 +8516,42 @@
           </a:prstGeom>
         </p:spPr>
       </p:pic>
+      <p:sp>
+        <p:nvSpPr>
+          <p:cNvPr id="2" name="pole tekstowe 1">
+            <a:extLst>
+              <a:ext uri="{FF2B5EF4-FFF2-40B4-BE49-F238E27FC236}">
+                <a16:creationId xmlns:a16="http://schemas.microsoft.com/office/drawing/2014/main" id="{E2212DD8-0766-4C93-A530-141931D7FE5E}"/>
+              </a:ext>
+            </a:extLst>
+          </p:cNvPr>
+          <p:cNvSpPr txBox="1"/>
+          <p:nvPr/>
+        </p:nvSpPr>
+        <p:spPr>
+          <a:xfrm>
+            <a:off x="344488" y="4941065"/>
+            <a:ext cx="8453612" cy="646331"/>
+          </a:xfrm>
+          <a:prstGeom prst="rect">
+            <a:avLst/>
+          </a:prstGeom>
+          <a:noFill/>
+        </p:spPr>
+        <p:txBody>
+          <a:bodyPr wrap="square" rtlCol="0">
+            <a:spAutoFit/>
+          </a:bodyPr>
+          <a:lstStyle/>
+          <a:p>
+            <a:pPr algn="just"/>
+            <a:r>
+              <a:rPr lang="pl-PL" dirty="0"/>
+              <a:t>Przedstawiono działanie wskaźnika wartości prędkości obrotowej silnika dla trzech różnych wartości otwarcia przepustnicy.</a:t>
+            </a:r>
+          </a:p>
+        </p:txBody>
+      </p:sp>
     </p:spTree>
   </p:cSld>
   <p:clrMapOvr>
@@ -8897,7 +8892,7 @@
         <p:spPr>
           <a:xfrm>
             <a:off x="308344" y="1488558"/>
-            <a:ext cx="7868093" cy="2031325"/>
+            <a:ext cx="7868093" cy="2957861"/>
           </a:xfrm>
           <a:prstGeom prst="rect">
             <a:avLst/>
@@ -8910,6 +8905,11 @@
           </a:bodyPr>
           <a:lstStyle/>
           <a:p>
+            <a:pPr algn="just">
+              <a:lnSpc>
+                <a:spcPct val="150000"/>
+              </a:lnSpc>
+            </a:pPr>
             <a:r>
               <a:rPr lang="pl-PL" dirty="0"/>
               <a:t>W środowisku </a:t>
@@ -8924,9 +8924,14 @@
             </a:r>
           </a:p>
           <a:p>
+            <a:pPr algn="just">
+              <a:lnSpc>
+                <a:spcPct val="150000"/>
+              </a:lnSpc>
+            </a:pPr>
             <a:r>
               <a:rPr lang="pl-PL" dirty="0"/>
-              <a:t>Dowiedzieliśmy się jak stworzyć elementy interfejsu użytkownika i połączyć je z wprowadzanymi wartościami. Nauczyliśmy się w jaki sposób możemy symulować działanie elementów wykonawczych samochodu. Zdobyte informacje pozwalają nam na zasymulowanie we własnym zakresie takich elementów jak wskaźnik poziomu paliwa, licznik prędkości samochodu, wskaźnik temperatury itp.</a:t>
+              <a:t>Dowiedzieliśmy się jak stworzyć elementy interfejsu użytkownika i połączyć je z wprowadzanymi wartościami. Nauczyliśmy się, w jaki sposób możemy symulować działanie elementów wykonawczych samochodu. Zdobyte informacje pozwalają nam na zasymulowanie we własnym zakresie takich elementów jak wskaźnik poziomu paliwa, licznik prędkości samochodu, wskaźnik temperatury itp.</a:t>
             </a:r>
           </a:p>
         </p:txBody>

</xml_diff>